<commit_message>
version 2 s Please enter the commit message for your changes. Lines starting
</commit_message>
<xml_diff>
--- a/le.pptx
+++ b/le.pptx
@@ -8,6 +8,8 @@
     <p:sldId id="256" r:id="rId2"/>
     <p:sldId id="257" r:id="rId3"/>
     <p:sldId id="258" r:id="rId4"/>
+    <p:sldId id="259" r:id="rId5"/>
+    <p:sldId id="260" r:id="rId6"/>
   </p:sldIdLst>
   <p:sldSz cx="12192000" cy="6858000"/>
   <p:notesSz cx="6858000" cy="9144000"/>
@@ -106,6 +108,11 @@
       </a:defRPr>
     </a:lvl9pPr>
   </p:defaultTextStyle>
+  <p:extLst>
+    <p:ext uri="{EFAFB233-063F-42B5-8137-9DF3F51BA10A}">
+      <p15:sldGuideLst xmlns:p15="http://schemas.microsoft.com/office/powerpoint/2012/main"/>
+    </p:ext>
+  </p:extLst>
 </p:presentation>
 </file>
 
@@ -3640,7 +3647,7 @@
         <p:spPr>
           <a:xfrm>
             <a:off x="2108200" y="4910667"/>
-            <a:ext cx="7476067" cy="1200329"/>
+            <a:ext cx="7476067" cy="923330"/>
           </a:xfrm>
           <a:prstGeom prst="rect">
             <a:avLst/>
@@ -3655,12 +3662,6 @@
           <a:p>
             <a:r>
               <a:rPr lang="es-ES" dirty="0"/>
-              <a:t>Con cd accedemos a carpetas</a:t>
-            </a:r>
-          </a:p>
-          <a:p>
-            <a:r>
-              <a:rPr lang="es-ES" dirty="0"/>
               <a:t>Git </a:t>
             </a:r>
             <a:r>
@@ -3673,10 +3674,7 @@
             </a:r>
           </a:p>
           <a:p>
-            <a:r>
-              <a:rPr lang="es-ES" dirty="0"/>
-              <a:t>Git status lista archivos cambiados y los que se van a añadir</a:t>
-            </a:r>
+            <a:endParaRPr lang="es-ES" dirty="0"/>
           </a:p>
           <a:p>
             <a:endParaRPr lang="es-ES" dirty="0"/>
@@ -3687,6 +3685,199 @@
     <p:extLst>
       <p:ext uri="{BB962C8B-B14F-4D97-AF65-F5344CB8AC3E}">
         <p14:creationId xmlns:p14="http://schemas.microsoft.com/office/powerpoint/2010/main" val="2620935543"/>
+      </p:ext>
+    </p:extLst>
+  </p:cSld>
+  <p:clrMapOvr>
+    <a:masterClrMapping/>
+  </p:clrMapOvr>
+</p:sld>
+</file>
+
+<file path=ppt/slides/slide4.xml><?xml version="1.0" encoding="utf-8"?>
+<p:sld xmlns:a="http://schemas.openxmlformats.org/drawingml/2006/main" xmlns:r="http://schemas.openxmlformats.org/officeDocument/2006/relationships" xmlns:p="http://schemas.openxmlformats.org/presentationml/2006/main">
+  <p:cSld>
+    <p:spTree>
+      <p:nvGrpSpPr>
+        <p:cNvPr id="1" name=""/>
+        <p:cNvGrpSpPr/>
+        <p:nvPr/>
+      </p:nvGrpSpPr>
+      <p:grpSpPr>
+        <a:xfrm>
+          <a:off x="0" y="0"/>
+          <a:ext cx="0" cy="0"/>
+          <a:chOff x="0" y="0"/>
+          <a:chExt cx="0" cy="0"/>
+        </a:xfrm>
+      </p:grpSpPr>
+      <p:pic>
+        <p:nvPicPr>
+          <p:cNvPr id="4" name="Marcador de contenido 3">
+            <a:extLst>
+              <a:ext uri="{FF2B5EF4-FFF2-40B4-BE49-F238E27FC236}">
+                <a16:creationId xmlns:a16="http://schemas.microsoft.com/office/drawing/2014/main" id="{6892D6F5-C8BE-4A49-952E-172F2DCBF12E}"/>
+              </a:ext>
+            </a:extLst>
+          </p:cNvPr>
+          <p:cNvPicPr>
+            <a:picLocks noChangeAspect="1"/>
+          </p:cNvPicPr>
+          <p:nvPr/>
+        </p:nvPicPr>
+        <p:blipFill rotWithShape="1">
+          <a:blip r:embed="rId2"/>
+          <a:srcRect l="50000" t="39961" r="2088" b="37468"/>
+          <a:stretch/>
+        </p:blipFill>
+        <p:spPr>
+          <a:xfrm>
+            <a:off x="2511565" y="1947333"/>
+            <a:ext cx="6869501" cy="1820332"/>
+          </a:xfrm>
+          <a:prstGeom prst="rect">
+            <a:avLst/>
+          </a:prstGeom>
+        </p:spPr>
+      </p:pic>
+      <p:sp>
+        <p:nvSpPr>
+          <p:cNvPr id="5" name="CuadroTexto 4">
+            <a:extLst>
+              <a:ext uri="{FF2B5EF4-FFF2-40B4-BE49-F238E27FC236}">
+                <a16:creationId xmlns:a16="http://schemas.microsoft.com/office/drawing/2014/main" id="{3B3A1DA7-A2BA-462E-8310-15FFE2FA6E16}"/>
+              </a:ext>
+            </a:extLst>
+          </p:cNvPr>
+          <p:cNvSpPr txBox="1"/>
+          <p:nvPr/>
+        </p:nvSpPr>
+        <p:spPr>
+          <a:xfrm>
+            <a:off x="2108200" y="4910667"/>
+            <a:ext cx="7476067" cy="646331"/>
+          </a:xfrm>
+          <a:prstGeom prst="rect">
+            <a:avLst/>
+          </a:prstGeom>
+          <a:noFill/>
+        </p:spPr>
+        <p:txBody>
+          <a:bodyPr wrap="square" rtlCol="0">
+            <a:spAutoFit/>
+          </a:bodyPr>
+          <a:lstStyle/>
+          <a:p>
+            <a:r>
+              <a:rPr lang="en-US" dirty="0"/>
+              <a:t>C</a:t>
+            </a:r>
+            <a:r>
+              <a:rPr lang="es-ES" dirty="0"/>
+              <a:t>o  </a:t>
+            </a:r>
+            <a:r>
+              <a:rPr lang="es-ES" dirty="0" err="1"/>
+              <a:t>git</a:t>
+            </a:r>
+            <a:r>
+              <a:rPr lang="es-ES" dirty="0"/>
+              <a:t> status listamos los archivos</a:t>
+            </a:r>
+          </a:p>
+          <a:p>
+            <a:endParaRPr lang="es-ES" dirty="0"/>
+          </a:p>
+        </p:txBody>
+      </p:sp>
+    </p:spTree>
+    <p:extLst>
+      <p:ext uri="{BB962C8B-B14F-4D97-AF65-F5344CB8AC3E}">
+        <p14:creationId xmlns:p14="http://schemas.microsoft.com/office/powerpoint/2010/main" val="2365737639"/>
+      </p:ext>
+    </p:extLst>
+  </p:cSld>
+  <p:clrMapOvr>
+    <a:masterClrMapping/>
+  </p:clrMapOvr>
+</p:sld>
+</file>
+
+<file path=ppt/slides/slide5.xml><?xml version="1.0" encoding="utf-8"?>
+<p:sld xmlns:a="http://schemas.openxmlformats.org/drawingml/2006/main" xmlns:r="http://schemas.openxmlformats.org/officeDocument/2006/relationships" xmlns:p="http://schemas.openxmlformats.org/presentationml/2006/main">
+  <p:cSld>
+    <p:spTree>
+      <p:nvGrpSpPr>
+        <p:cNvPr id="1" name=""/>
+        <p:cNvGrpSpPr/>
+        <p:nvPr/>
+      </p:nvGrpSpPr>
+      <p:grpSpPr>
+        <a:xfrm>
+          <a:off x="0" y="0"/>
+          <a:ext cx="0" cy="0"/>
+          <a:chOff x="0" y="0"/>
+          <a:chExt cx="0" cy="0"/>
+        </a:xfrm>
+      </p:grpSpPr>
+      <p:sp>
+        <p:nvSpPr>
+          <p:cNvPr id="2" name="Título 1">
+            <a:extLst>
+              <a:ext uri="{FF2B5EF4-FFF2-40B4-BE49-F238E27FC236}">
+                <a16:creationId xmlns:a16="http://schemas.microsoft.com/office/drawing/2014/main" id="{810AEAD6-B350-4193-BFFB-8CBF9C183B5E}"/>
+              </a:ext>
+            </a:extLst>
+          </p:cNvPr>
+          <p:cNvSpPr>
+            <a:spLocks noGrp="1"/>
+          </p:cNvSpPr>
+          <p:nvPr>
+            <p:ph type="title"/>
+          </p:nvPr>
+        </p:nvSpPr>
+        <p:spPr/>
+        <p:txBody>
+          <a:bodyPr/>
+          <a:lstStyle/>
+          <a:p>
+            <a:endParaRPr lang="es-ES" dirty="0"/>
+          </a:p>
+        </p:txBody>
+      </p:sp>
+      <p:sp>
+        <p:nvSpPr>
+          <p:cNvPr id="3" name="Marcador de contenido 2">
+            <a:extLst>
+              <a:ext uri="{FF2B5EF4-FFF2-40B4-BE49-F238E27FC236}">
+                <a16:creationId xmlns:a16="http://schemas.microsoft.com/office/drawing/2014/main" id="{EE1FEC5E-DDC2-4B6E-BBB0-B9AE7580FD70}"/>
+              </a:ext>
+            </a:extLst>
+          </p:cNvPr>
+          <p:cNvSpPr>
+            <a:spLocks noGrp="1"/>
+          </p:cNvSpPr>
+          <p:nvPr>
+            <p:ph idx="1"/>
+          </p:nvPr>
+        </p:nvSpPr>
+        <p:spPr/>
+        <p:txBody>
+          <a:bodyPr/>
+          <a:lstStyle/>
+          <a:p>
+            <a:r>
+              <a:rPr lang="en-US"/>
+              <a:t>f</a:t>
+            </a:r>
+            <a:endParaRPr lang="es-ES"/>
+          </a:p>
+        </p:txBody>
+      </p:sp>
+    </p:spTree>
+    <p:extLst>
+      <p:ext uri="{BB962C8B-B14F-4D97-AF65-F5344CB8AC3E}">
+        <p14:creationId xmlns:p14="http://schemas.microsoft.com/office/powerpoint/2010/main" val="182726445"/>
       </p:ext>
     </p:extLst>
   </p:cSld>

</xml_diff>